<commit_message>
Added Icenium references. Switched long URLs to bit.ly links.
</commit_message>
<xml_diff>
--- a/Talks/Cross-Platform Mobile Development in Visual Studio.pptx
+++ b/Talks/Cross-Platform Mobile Development in Visual Studio.pptx
@@ -6,7 +6,7 @@
     <p:sldMasterId id="2147483660" r:id="rId2"/>
   </p:sldMasterIdLst>
   <p:notesMasterIdLst>
-    <p:notesMasterId r:id="rId31"/>
+    <p:notesMasterId r:id="rId30"/>
   </p:notesMasterIdLst>
   <p:sldIdLst>
     <p:sldId id="256" r:id="rId3"/>
@@ -33,10 +33,9 @@
     <p:sldId id="258" r:id="rId24"/>
     <p:sldId id="259" r:id="rId25"/>
     <p:sldId id="289" r:id="rId26"/>
-    <p:sldId id="296" r:id="rId27"/>
-    <p:sldId id="297" r:id="rId28"/>
-    <p:sldId id="282" r:id="rId29"/>
-    <p:sldId id="291" r:id="rId30"/>
+    <p:sldId id="297" r:id="rId27"/>
+    <p:sldId id="282" r:id="rId28"/>
+    <p:sldId id="291" r:id="rId29"/>
   </p:sldIdLst>
   <p:sldSz cx="12192000" cy="6858000"/>
   <p:notesSz cx="6858000" cy="9144000"/>
@@ -225,7 +224,7 @@
           <a:p>
             <a:fld id="{E76DD8C9-2B94-4058-A314-148EDBA91870}" type="datetimeFigureOut">
               <a:rPr lang="en-GB" smtClean="0"/>
-              <a:t>19/09/2013</a:t>
+              <a:t>12/10/2013</a:t>
             </a:fld>
             <a:endParaRPr lang="en-GB"/>
           </a:p>
@@ -6411,6 +6410,247 @@
           <a:bodyPr/>
           <a:lstStyle/>
           <a:p>
+            <a:pPr rtl="0"/>
+            <a:r>
+              <a:rPr lang="en-GB" sz="1200" b="0" i="0" u="none" strike="noStrike" kern="1200" dirty="0" smtClean="0">
+                <a:solidFill>
+                  <a:schemeClr val="tx1"/>
+                </a:solidFill>
+                <a:effectLst/>
+                <a:latin typeface="+mn-lt"/>
+                <a:ea typeface="+mn-ea"/>
+                <a:cs typeface="+mn-cs"/>
+              </a:rPr>
+              <a:t>There are obviously the standard app stores: the </a:t>
+            </a:r>
+            <a:r>
+              <a:rPr lang="en-GB" sz="1200" b="0" i="0" u="none" strike="noStrike" kern="1200" dirty="0" err="1" smtClean="0">
+                <a:solidFill>
+                  <a:schemeClr val="tx1"/>
+                </a:solidFill>
+                <a:effectLst/>
+                <a:latin typeface="+mn-lt"/>
+                <a:ea typeface="+mn-ea"/>
+                <a:cs typeface="+mn-cs"/>
+              </a:rPr>
+              <a:t>iOS</a:t>
+            </a:r>
+            <a:r>
+              <a:rPr lang="en-GB" sz="1200" b="0" i="0" u="none" strike="noStrike" kern="1200" dirty="0" smtClean="0">
+                <a:solidFill>
+                  <a:schemeClr val="tx1"/>
+                </a:solidFill>
+                <a:effectLst/>
+                <a:latin typeface="+mn-lt"/>
+                <a:ea typeface="+mn-ea"/>
+                <a:cs typeface="+mn-cs"/>
+              </a:rPr>
+              <a:t> app store, and Google Play. But what if your app’s meant only to be used by people in your company?</a:t>
+            </a:r>
+            <a:endParaRPr lang="en-GB" b="0" dirty="0" smtClean="0">
+              <a:effectLst/>
+            </a:endParaRPr>
+          </a:p>
+          <a:p>
+            <a:pPr rtl="0"/>
+            <a:r>
+              <a:rPr lang="en-GB" b="0" dirty="0" smtClean="0">
+                <a:effectLst/>
+              </a:rPr>
+              <a:t/>
+            </a:r>
+            <a:br>
+              <a:rPr lang="en-GB" b="0" dirty="0" smtClean="0">
+                <a:effectLst/>
+              </a:rPr>
+            </a:br>
+            <a:r>
+              <a:rPr lang="en-GB" sz="1200" b="0" i="0" u="none" strike="noStrike" kern="1200" dirty="0" smtClean="0">
+                <a:solidFill>
+                  <a:schemeClr val="tx1"/>
+                </a:solidFill>
+                <a:effectLst/>
+                <a:latin typeface="+mn-lt"/>
+                <a:ea typeface="+mn-ea"/>
+                <a:cs typeface="+mn-cs"/>
+              </a:rPr>
+              <a:t>For Android you can obviously just allow people to download and install it, but then you have to worry about updates. A better approach might be to publish it to the Google Play Private Channel for Google Apps: </a:t>
+            </a:r>
+            <a:r>
+              <a:rPr lang="en-GB" sz="1200" b="0" i="0" u="sng" strike="noStrike" kern="1200" dirty="0" smtClean="0">
+                <a:solidFill>
+                  <a:schemeClr val="tx1"/>
+                </a:solidFill>
+                <a:effectLst/>
+                <a:latin typeface="+mn-lt"/>
+                <a:ea typeface="+mn-ea"/>
+                <a:cs typeface="+mn-cs"/>
+                <a:hlinkClick r:id="rId3"/>
+              </a:rPr>
+              <a:t>http://support.google.com/a/bin/answer.py?hl=en-uk&amp;hlrm=en&amp;answer=2494992</a:t>
+            </a:r>
+            <a:r>
+              <a:rPr lang="en-GB" sz="1200" b="0" i="0" u="none" strike="noStrike" kern="1200" dirty="0" smtClean="0">
+                <a:solidFill>
+                  <a:schemeClr val="tx1"/>
+                </a:solidFill>
+                <a:effectLst/>
+                <a:latin typeface="+mn-lt"/>
+                <a:ea typeface="+mn-ea"/>
+                <a:cs typeface="+mn-cs"/>
+              </a:rPr>
+              <a:t>.</a:t>
+            </a:r>
+            <a:endParaRPr lang="en-GB" b="0" dirty="0" smtClean="0">
+              <a:effectLst/>
+            </a:endParaRPr>
+          </a:p>
+          <a:p>
+            <a:r>
+              <a:rPr lang="en-GB" b="0" dirty="0" smtClean="0">
+                <a:effectLst/>
+              </a:rPr>
+              <a:t/>
+            </a:r>
+            <a:br>
+              <a:rPr lang="en-GB" b="0" dirty="0" smtClean="0">
+                <a:effectLst/>
+              </a:rPr>
+            </a:br>
+            <a:r>
+              <a:rPr lang="en-GB" sz="1200" b="0" i="0" u="none" strike="noStrike" kern="1200" dirty="0" smtClean="0">
+                <a:solidFill>
+                  <a:schemeClr val="tx1"/>
+                </a:solidFill>
+                <a:effectLst/>
+                <a:latin typeface="+mn-lt"/>
+                <a:ea typeface="+mn-ea"/>
+                <a:cs typeface="+mn-cs"/>
+              </a:rPr>
+              <a:t>For </a:t>
+            </a:r>
+            <a:r>
+              <a:rPr lang="en-GB" sz="1200" b="0" i="0" u="none" strike="noStrike" kern="1200" dirty="0" err="1" smtClean="0">
+                <a:solidFill>
+                  <a:schemeClr val="tx1"/>
+                </a:solidFill>
+                <a:effectLst/>
+                <a:latin typeface="+mn-lt"/>
+                <a:ea typeface="+mn-ea"/>
+                <a:cs typeface="+mn-cs"/>
+              </a:rPr>
+              <a:t>iOS</a:t>
+            </a:r>
+            <a:r>
+              <a:rPr lang="en-GB" sz="1200" b="0" i="0" u="none" strike="noStrike" kern="1200" dirty="0" smtClean="0">
+                <a:solidFill>
+                  <a:schemeClr val="tx1"/>
+                </a:solidFill>
+                <a:effectLst/>
+                <a:latin typeface="+mn-lt"/>
+                <a:ea typeface="+mn-ea"/>
+                <a:cs typeface="+mn-cs"/>
+              </a:rPr>
+              <a:t> there’s the </a:t>
+            </a:r>
+            <a:r>
+              <a:rPr lang="en-GB" sz="1200" b="0" i="0" u="none" strike="noStrike" kern="1200" dirty="0" err="1" smtClean="0">
+                <a:solidFill>
+                  <a:schemeClr val="tx1"/>
+                </a:solidFill>
+                <a:effectLst/>
+                <a:latin typeface="+mn-lt"/>
+                <a:ea typeface="+mn-ea"/>
+                <a:cs typeface="+mn-cs"/>
+              </a:rPr>
+              <a:t>iOS</a:t>
+            </a:r>
+            <a:r>
+              <a:rPr lang="en-GB" sz="1200" b="0" i="0" u="none" strike="noStrike" kern="1200" dirty="0" smtClean="0">
+                <a:solidFill>
+                  <a:schemeClr val="tx1"/>
+                </a:solidFill>
+                <a:effectLst/>
+                <a:latin typeface="+mn-lt"/>
+                <a:ea typeface="+mn-ea"/>
+                <a:cs typeface="+mn-cs"/>
+              </a:rPr>
+              <a:t> Developer Enterprise Program, specifically for distributing in-house apps: </a:t>
+            </a:r>
+            <a:r>
+              <a:rPr lang="en-GB" sz="1200" b="0" i="0" u="sng" strike="noStrike" kern="1200" dirty="0" smtClean="0">
+                <a:solidFill>
+                  <a:schemeClr val="tx1"/>
+                </a:solidFill>
+                <a:effectLst/>
+                <a:latin typeface="+mn-lt"/>
+                <a:ea typeface="+mn-ea"/>
+                <a:cs typeface="+mn-cs"/>
+                <a:hlinkClick r:id="rId4"/>
+              </a:rPr>
+              <a:t>https://developer.apple.com/programs/ios/enterprise/</a:t>
+            </a:r>
+            <a:r>
+              <a:rPr lang="en-GB" sz="1200" b="0" i="0" u="none" strike="noStrike" kern="1200" dirty="0" smtClean="0">
+                <a:solidFill>
+                  <a:schemeClr val="tx1"/>
+                </a:solidFill>
+                <a:effectLst/>
+                <a:latin typeface="+mn-lt"/>
+                <a:ea typeface="+mn-ea"/>
+                <a:cs typeface="+mn-cs"/>
+              </a:rPr>
+              <a:t>. There are also other unofficial options, such as </a:t>
+            </a:r>
+            <a:r>
+              <a:rPr lang="en-GB" sz="1200" b="0" i="0" u="none" strike="noStrike" kern="1200" dirty="0" err="1" smtClean="0">
+                <a:solidFill>
+                  <a:schemeClr val="tx1"/>
+                </a:solidFill>
+                <a:effectLst/>
+                <a:latin typeface="+mn-lt"/>
+                <a:ea typeface="+mn-ea"/>
+                <a:cs typeface="+mn-cs"/>
+              </a:rPr>
+              <a:t>TestFlight</a:t>
+            </a:r>
+            <a:r>
+              <a:rPr lang="en-GB" sz="1200" b="0" i="0" u="none" strike="noStrike" kern="1200" dirty="0" smtClean="0">
+                <a:solidFill>
+                  <a:schemeClr val="tx1"/>
+                </a:solidFill>
+                <a:effectLst/>
+                <a:latin typeface="+mn-lt"/>
+                <a:ea typeface="+mn-ea"/>
+                <a:cs typeface="+mn-cs"/>
+              </a:rPr>
+              <a:t>. Apple also offers the Volume Purchase Program for Business, which allows you to privately distribute B2B apps, which can be paid for or free: </a:t>
+            </a:r>
+            <a:r>
+              <a:rPr lang="en-GB" sz="1200" b="0" i="0" u="sng" strike="noStrike" kern="1200" dirty="0" smtClean="0">
+                <a:solidFill>
+                  <a:schemeClr val="tx1"/>
+                </a:solidFill>
+                <a:effectLst/>
+                <a:latin typeface="+mn-lt"/>
+                <a:ea typeface="+mn-ea"/>
+                <a:cs typeface="+mn-cs"/>
+                <a:hlinkClick r:id="rId5"/>
+              </a:rPr>
+              <a:t>https://developer.apple.com/programs/volume/b2b/</a:t>
+            </a:r>
+            <a:r>
+              <a:rPr lang="en-GB" sz="1200" b="0" i="0" u="none" strike="noStrike" kern="1200" dirty="0" smtClean="0">
+                <a:solidFill>
+                  <a:schemeClr val="tx1"/>
+                </a:solidFill>
+                <a:effectLst/>
+                <a:latin typeface="+mn-lt"/>
+                <a:ea typeface="+mn-ea"/>
+                <a:cs typeface="+mn-cs"/>
+              </a:rPr>
+              <a:t>.</a:t>
+            </a:r>
             <a:endParaRPr lang="en-GB" dirty="0"/>
           </a:p>
         </p:txBody>
@@ -6441,7 +6681,7 @@
     </p:spTree>
     <p:extLst>
       <p:ext uri="{BB962C8B-B14F-4D97-AF65-F5344CB8AC3E}">
-        <p14:creationId xmlns:p14="http://schemas.microsoft.com/office/powerpoint/2010/main" val="3124423221"/>
+        <p14:creationId xmlns:p14="http://schemas.microsoft.com/office/powerpoint/2010/main" val="3345224843"/>
       </p:ext>
     </p:extLst>
   </p:cSld>
@@ -6495,247 +6735,36 @@
           <a:bodyPr/>
           <a:lstStyle/>
           <a:p>
-            <a:pPr rtl="0"/>
-            <a:r>
-              <a:rPr lang="en-GB" sz="1200" b="0" i="0" u="none" strike="noStrike" kern="1200" dirty="0" smtClean="0">
-                <a:solidFill>
-                  <a:schemeClr val="tx1"/>
-                </a:solidFill>
-                <a:effectLst/>
-                <a:latin typeface="+mn-lt"/>
-                <a:ea typeface="+mn-ea"/>
-                <a:cs typeface="+mn-cs"/>
-              </a:rPr>
-              <a:t>There are obviously the standard app stores: the </a:t>
-            </a:r>
-            <a:r>
-              <a:rPr lang="en-GB" sz="1200" b="0" i="0" u="none" strike="noStrike" kern="1200" dirty="0" err="1" smtClean="0">
-                <a:solidFill>
-                  <a:schemeClr val="tx1"/>
-                </a:solidFill>
-                <a:effectLst/>
-                <a:latin typeface="+mn-lt"/>
-                <a:ea typeface="+mn-ea"/>
-                <a:cs typeface="+mn-cs"/>
-              </a:rPr>
+            <a:r>
+              <a:rPr lang="en-GB" dirty="0" smtClean="0"/>
+              <a:t>Keep an eye out for</a:t>
+            </a:r>
+            <a:r>
+              <a:rPr lang="en-GB" baseline="0" dirty="0" smtClean="0"/>
+              <a:t> this cool new functionality coming to Nomad soon.</a:t>
+            </a:r>
+          </a:p>
+          <a:p>
+            <a:endParaRPr lang="en-GB" baseline="0" dirty="0" smtClean="0"/>
+          </a:p>
+          <a:p>
+            <a:r>
+              <a:rPr lang="en-GB" baseline="0" dirty="0" smtClean="0"/>
+              <a:t>We’re REALLY excited about the on-device debugging, which will allow you to debug code running on any </a:t>
+            </a:r>
+            <a:r>
+              <a:rPr lang="en-GB" baseline="0" dirty="0" err="1" smtClean="0"/>
               <a:t>iOS</a:t>
             </a:r>
             <a:r>
-              <a:rPr lang="en-GB" sz="1200" b="0" i="0" u="none" strike="noStrike" kern="1200" dirty="0" smtClean="0">
-                <a:solidFill>
-                  <a:schemeClr val="tx1"/>
-                </a:solidFill>
-                <a:effectLst/>
-                <a:latin typeface="+mn-lt"/>
-                <a:ea typeface="+mn-ea"/>
-                <a:cs typeface="+mn-cs"/>
-              </a:rPr>
-              <a:t> app store, and Google Play. But what if your app’s meant only to be used by people in your company?</a:t>
-            </a:r>
-            <a:endParaRPr lang="en-GB" b="0" dirty="0" smtClean="0">
-              <a:effectLst/>
-            </a:endParaRPr>
-          </a:p>
-          <a:p>
-            <a:pPr rtl="0"/>
-            <a:r>
-              <a:rPr lang="en-GB" b="0" dirty="0" smtClean="0">
-                <a:effectLst/>
-              </a:rPr>
-              <a:t/>
-            </a:r>
-            <a:br>
-              <a:rPr lang="en-GB" b="0" dirty="0" smtClean="0">
-                <a:effectLst/>
-              </a:rPr>
-            </a:br>
-            <a:r>
-              <a:rPr lang="en-GB" sz="1200" b="0" i="0" u="none" strike="noStrike" kern="1200" dirty="0" smtClean="0">
-                <a:solidFill>
-                  <a:schemeClr val="tx1"/>
-                </a:solidFill>
-                <a:effectLst/>
-                <a:latin typeface="+mn-lt"/>
-                <a:ea typeface="+mn-ea"/>
-                <a:cs typeface="+mn-cs"/>
-              </a:rPr>
-              <a:t>For Android you can obviously just allow people to download and install it, but then you have to worry about updates. A better approach might be to publish it to the Google Play Private Channel for Google Apps: </a:t>
-            </a:r>
-            <a:r>
-              <a:rPr lang="en-GB" sz="1200" b="0" i="0" u="sng" strike="noStrike" kern="1200" dirty="0" smtClean="0">
-                <a:solidFill>
-                  <a:schemeClr val="tx1"/>
-                </a:solidFill>
-                <a:effectLst/>
-                <a:latin typeface="+mn-lt"/>
-                <a:ea typeface="+mn-ea"/>
-                <a:cs typeface="+mn-cs"/>
-                <a:hlinkClick r:id="rId3"/>
-              </a:rPr>
-              <a:t>http://support.google.com/a/bin/answer.py?hl=en-uk&amp;hlrm=en&amp;answer=2494992</a:t>
-            </a:r>
-            <a:r>
-              <a:rPr lang="en-GB" sz="1200" b="0" i="0" u="none" strike="noStrike" kern="1200" dirty="0" smtClean="0">
-                <a:solidFill>
-                  <a:schemeClr val="tx1"/>
-                </a:solidFill>
-                <a:effectLst/>
-                <a:latin typeface="+mn-lt"/>
-                <a:ea typeface="+mn-ea"/>
-                <a:cs typeface="+mn-cs"/>
-              </a:rPr>
-              <a:t>.</a:t>
-            </a:r>
-            <a:endParaRPr lang="en-GB" b="0" dirty="0" smtClean="0">
-              <a:effectLst/>
-            </a:endParaRPr>
-          </a:p>
-          <a:p>
-            <a:r>
-              <a:rPr lang="en-GB" b="0" dirty="0" smtClean="0">
-                <a:effectLst/>
-              </a:rPr>
-              <a:t/>
-            </a:r>
-            <a:br>
-              <a:rPr lang="en-GB" b="0" dirty="0" smtClean="0">
-                <a:effectLst/>
-              </a:rPr>
-            </a:br>
-            <a:r>
-              <a:rPr lang="en-GB" sz="1200" b="0" i="0" u="none" strike="noStrike" kern="1200" dirty="0" smtClean="0">
-                <a:solidFill>
-                  <a:schemeClr val="tx1"/>
-                </a:solidFill>
-                <a:effectLst/>
-                <a:latin typeface="+mn-lt"/>
-                <a:ea typeface="+mn-ea"/>
-                <a:cs typeface="+mn-cs"/>
-              </a:rPr>
-              <a:t>For </a:t>
-            </a:r>
-            <a:r>
-              <a:rPr lang="en-GB" sz="1200" b="0" i="0" u="none" strike="noStrike" kern="1200" dirty="0" err="1" smtClean="0">
-                <a:solidFill>
-                  <a:schemeClr val="tx1"/>
-                </a:solidFill>
-                <a:effectLst/>
-                <a:latin typeface="+mn-lt"/>
-                <a:ea typeface="+mn-ea"/>
-                <a:cs typeface="+mn-cs"/>
-              </a:rPr>
-              <a:t>iOS</a:t>
-            </a:r>
-            <a:r>
-              <a:rPr lang="en-GB" sz="1200" b="0" i="0" u="none" strike="noStrike" kern="1200" dirty="0" smtClean="0">
-                <a:solidFill>
-                  <a:schemeClr val="tx1"/>
-                </a:solidFill>
-                <a:effectLst/>
-                <a:latin typeface="+mn-lt"/>
-                <a:ea typeface="+mn-ea"/>
-                <a:cs typeface="+mn-cs"/>
-              </a:rPr>
-              <a:t> there’s the </a:t>
-            </a:r>
-            <a:r>
-              <a:rPr lang="en-GB" sz="1200" b="0" i="0" u="none" strike="noStrike" kern="1200" dirty="0" err="1" smtClean="0">
-                <a:solidFill>
-                  <a:schemeClr val="tx1"/>
-                </a:solidFill>
-                <a:effectLst/>
-                <a:latin typeface="+mn-lt"/>
-                <a:ea typeface="+mn-ea"/>
-                <a:cs typeface="+mn-cs"/>
-              </a:rPr>
-              <a:t>iOS</a:t>
-            </a:r>
-            <a:r>
-              <a:rPr lang="en-GB" sz="1200" b="0" i="0" u="none" strike="noStrike" kern="1200" dirty="0" smtClean="0">
-                <a:solidFill>
-                  <a:schemeClr val="tx1"/>
-                </a:solidFill>
-                <a:effectLst/>
-                <a:latin typeface="+mn-lt"/>
-                <a:ea typeface="+mn-ea"/>
-                <a:cs typeface="+mn-cs"/>
-              </a:rPr>
-              <a:t> Developer Enterprise Program, specifically for distributing in-house apps: </a:t>
-            </a:r>
-            <a:r>
-              <a:rPr lang="en-GB" sz="1200" b="0" i="0" u="sng" strike="noStrike" kern="1200" dirty="0" smtClean="0">
-                <a:solidFill>
-                  <a:schemeClr val="tx1"/>
-                </a:solidFill>
-                <a:effectLst/>
-                <a:latin typeface="+mn-lt"/>
-                <a:ea typeface="+mn-ea"/>
-                <a:cs typeface="+mn-cs"/>
-                <a:hlinkClick r:id="rId4"/>
-              </a:rPr>
-              <a:t>https://developer.apple.com/programs/ios/enterprise/</a:t>
-            </a:r>
-            <a:r>
-              <a:rPr lang="en-GB" sz="1200" b="0" i="0" u="none" strike="noStrike" kern="1200" dirty="0" smtClean="0">
-                <a:solidFill>
-                  <a:schemeClr val="tx1"/>
-                </a:solidFill>
-                <a:effectLst/>
-                <a:latin typeface="+mn-lt"/>
-                <a:ea typeface="+mn-ea"/>
-                <a:cs typeface="+mn-cs"/>
-              </a:rPr>
-              <a:t>. There are also other unofficial options, such as </a:t>
-            </a:r>
-            <a:r>
-              <a:rPr lang="en-GB" sz="1200" b="0" i="0" u="none" strike="noStrike" kern="1200" dirty="0" err="1" smtClean="0">
-                <a:solidFill>
-                  <a:schemeClr val="tx1"/>
-                </a:solidFill>
-                <a:effectLst/>
-                <a:latin typeface="+mn-lt"/>
-                <a:ea typeface="+mn-ea"/>
-                <a:cs typeface="+mn-cs"/>
-              </a:rPr>
-              <a:t>TestFlight</a:t>
-            </a:r>
-            <a:r>
-              <a:rPr lang="en-GB" sz="1200" b="0" i="0" u="none" strike="noStrike" kern="1200" dirty="0" smtClean="0">
-                <a:solidFill>
-                  <a:schemeClr val="tx1"/>
-                </a:solidFill>
-                <a:effectLst/>
-                <a:latin typeface="+mn-lt"/>
-                <a:ea typeface="+mn-ea"/>
-                <a:cs typeface="+mn-cs"/>
-              </a:rPr>
-              <a:t>. Apple also offers the Volume Purchase Program for Business, which allows you to privately distribute B2B apps, which can be paid for or free: </a:t>
-            </a:r>
-            <a:r>
-              <a:rPr lang="en-GB" sz="1200" b="0" i="0" u="sng" strike="noStrike" kern="1200" dirty="0" smtClean="0">
-                <a:solidFill>
-                  <a:schemeClr val="tx1"/>
-                </a:solidFill>
-                <a:effectLst/>
-                <a:latin typeface="+mn-lt"/>
-                <a:ea typeface="+mn-ea"/>
-                <a:cs typeface="+mn-cs"/>
-                <a:hlinkClick r:id="rId5"/>
-              </a:rPr>
-              <a:t>https://developer.apple.com/programs/volume/b2b/</a:t>
-            </a:r>
-            <a:r>
-              <a:rPr lang="en-GB" sz="1200" b="0" i="0" u="none" strike="noStrike" kern="1200" dirty="0" smtClean="0">
-                <a:solidFill>
-                  <a:schemeClr val="tx1"/>
-                </a:solidFill>
-                <a:effectLst/>
-                <a:latin typeface="+mn-lt"/>
-                <a:ea typeface="+mn-ea"/>
-                <a:cs typeface="+mn-cs"/>
-              </a:rPr>
-              <a:t>.</a:t>
-            </a:r>
+              <a:rPr lang="en-GB" baseline="0" dirty="0" smtClean="0"/>
+              <a:t> or Android device. In theory we could extend this so that you could debug on any device running anywhere in the world – think about what that could do for field support!</a:t>
+            </a:r>
+          </a:p>
+          <a:p>
+            <a:endParaRPr lang="en-GB" baseline="0" dirty="0" smtClean="0"/>
+          </a:p>
+          <a:p>
             <a:endParaRPr lang="en-GB" dirty="0"/>
           </a:p>
         </p:txBody>
@@ -6766,7 +6795,7 @@
     </p:spTree>
     <p:extLst>
       <p:ext uri="{BB962C8B-B14F-4D97-AF65-F5344CB8AC3E}">
-        <p14:creationId xmlns:p14="http://schemas.microsoft.com/office/powerpoint/2010/main" val="3345224843"/>
+        <p14:creationId xmlns:p14="http://schemas.microsoft.com/office/powerpoint/2010/main" val="2450865896"/>
       </p:ext>
     </p:extLst>
   </p:cSld>
@@ -6820,120 +6849,6 @@
           <a:bodyPr/>
           <a:lstStyle/>
           <a:p>
-            <a:r>
-              <a:rPr lang="en-GB" dirty="0" smtClean="0"/>
-              <a:t>Keep an eye out for</a:t>
-            </a:r>
-            <a:r>
-              <a:rPr lang="en-GB" baseline="0" dirty="0" smtClean="0"/>
-              <a:t> this cool new functionality coming to Nomad soon.</a:t>
-            </a:r>
-          </a:p>
-          <a:p>
-            <a:endParaRPr lang="en-GB" baseline="0" dirty="0" smtClean="0"/>
-          </a:p>
-          <a:p>
-            <a:r>
-              <a:rPr lang="en-GB" baseline="0" dirty="0" smtClean="0"/>
-              <a:t>We’re REALLY excited about the on-device debugging, which will allow you to debug code running on any </a:t>
-            </a:r>
-            <a:r>
-              <a:rPr lang="en-GB" baseline="0" dirty="0" err="1" smtClean="0"/>
-              <a:t>iOS</a:t>
-            </a:r>
-            <a:r>
-              <a:rPr lang="en-GB" baseline="0" dirty="0" smtClean="0"/>
-              <a:t> or Android device. In theory we could extend this so that you could debug on any device running anywhere in the world – think about what that could do for field support!</a:t>
-            </a:r>
-          </a:p>
-          <a:p>
-            <a:endParaRPr lang="en-GB" baseline="0" dirty="0" smtClean="0"/>
-          </a:p>
-          <a:p>
-            <a:endParaRPr lang="en-GB" dirty="0"/>
-          </a:p>
-        </p:txBody>
-      </p:sp>
-      <p:sp>
-        <p:nvSpPr>
-          <p:cNvPr id="4" name="Slide Number Placeholder 3"/>
-          <p:cNvSpPr>
-            <a:spLocks noGrp="1"/>
-          </p:cNvSpPr>
-          <p:nvPr>
-            <p:ph type="sldNum" sz="quarter" idx="10"/>
-          </p:nvPr>
-        </p:nvSpPr>
-        <p:spPr/>
-        <p:txBody>
-          <a:bodyPr/>
-          <a:lstStyle/>
-          <a:p>
-            <a:fld id="{607747BA-08CD-47D7-9E37-8CD2BBC3BB04}" type="slidenum">
-              <a:rPr lang="en-GB" smtClean="0"/>
-              <a:t>27</a:t>
-            </a:fld>
-            <a:endParaRPr lang="en-GB"/>
-          </a:p>
-        </p:txBody>
-      </p:sp>
-    </p:spTree>
-    <p:extLst>
-      <p:ext uri="{BB962C8B-B14F-4D97-AF65-F5344CB8AC3E}">
-        <p14:creationId xmlns:p14="http://schemas.microsoft.com/office/powerpoint/2010/main" val="2450865896"/>
-      </p:ext>
-    </p:extLst>
-  </p:cSld>
-  <p:clrMapOvr>
-    <a:masterClrMapping/>
-  </p:clrMapOvr>
-</p:notes>
-</file>
-
-<file path=ppt/notesSlides/notesSlide28.xml><?xml version="1.0" encoding="utf-8"?>
-<p:notes xmlns:a="http://schemas.openxmlformats.org/drawingml/2006/main" xmlns:r="http://schemas.openxmlformats.org/officeDocument/2006/relationships" xmlns:p="http://schemas.openxmlformats.org/presentationml/2006/main">
-  <p:cSld>
-    <p:spTree>
-      <p:nvGrpSpPr>
-        <p:cNvPr id="1" name=""/>
-        <p:cNvGrpSpPr/>
-        <p:nvPr/>
-      </p:nvGrpSpPr>
-      <p:grpSpPr>
-        <a:xfrm>
-          <a:off x="0" y="0"/>
-          <a:ext cx="0" cy="0"/>
-          <a:chOff x="0" y="0"/>
-          <a:chExt cx="0" cy="0"/>
-        </a:xfrm>
-      </p:grpSpPr>
-      <p:sp>
-        <p:nvSpPr>
-          <p:cNvPr id="2" name="Slide Image Placeholder 1"/>
-          <p:cNvSpPr>
-            <a:spLocks noGrp="1" noRot="1" noChangeAspect="1"/>
-          </p:cNvSpPr>
-          <p:nvPr>
-            <p:ph type="sldImg"/>
-          </p:nvPr>
-        </p:nvSpPr>
-        <p:spPr/>
-      </p:sp>
-      <p:sp>
-        <p:nvSpPr>
-          <p:cNvPr id="3" name="Notes Placeholder 2"/>
-          <p:cNvSpPr>
-            <a:spLocks noGrp="1"/>
-          </p:cNvSpPr>
-          <p:nvPr>
-            <p:ph type="body" idx="1"/>
-          </p:nvPr>
-        </p:nvSpPr>
-        <p:spPr/>
-        <p:txBody>
-          <a:bodyPr/>
-          <a:lstStyle/>
-          <a:p>
             <a:pPr rtl="0"/>
             <a:r>
               <a:rPr lang="en-GB" sz="1200" b="0" i="0" u="none" strike="noStrike" kern="1200" dirty="0" smtClean="0">
@@ -7224,7 +7139,7 @@
           <a:p>
             <a:fld id="{607747BA-08CD-47D7-9E37-8CD2BBC3BB04}" type="slidenum">
               <a:rPr lang="en-GB" smtClean="0"/>
-              <a:t>28</a:t>
+              <a:t>27</a:t>
             </a:fld>
             <a:endParaRPr lang="en-GB"/>
           </a:p>
@@ -8875,7 +8790,7 @@
           <a:p>
             <a:fld id="{71EDC1E4-0993-46CC-9DA2-B47785EF46C1}" type="datetimeFigureOut">
               <a:rPr lang="en-GB" smtClean="0"/>
-              <a:t>19/09/2013</a:t>
+              <a:t>12/10/2013</a:t>
             </a:fld>
             <a:endParaRPr lang="en-GB"/>
           </a:p>
@@ -9045,7 +8960,7 @@
           <a:p>
             <a:fld id="{71EDC1E4-0993-46CC-9DA2-B47785EF46C1}" type="datetimeFigureOut">
               <a:rPr lang="en-GB" smtClean="0"/>
-              <a:t>19/09/2013</a:t>
+              <a:t>12/10/2013</a:t>
             </a:fld>
             <a:endParaRPr lang="en-GB"/>
           </a:p>
@@ -9225,7 +9140,7 @@
           <a:p>
             <a:fld id="{71EDC1E4-0993-46CC-9DA2-B47785EF46C1}" type="datetimeFigureOut">
               <a:rPr lang="en-GB" smtClean="0"/>
-              <a:t>19/09/2013</a:t>
+              <a:t>12/10/2013</a:t>
             </a:fld>
             <a:endParaRPr lang="en-GB"/>
           </a:p>
@@ -9474,7 +9389,7 @@
                 </a:solidFill>
               </a:rPr>
               <a:pPr/>
-              <a:t>9/19/2013</a:t>
+              <a:t>10/12/2013</a:t>
             </a:fld>
             <a:endParaRPr lang="en-US">
               <a:solidFill>
@@ -9676,7 +9591,7 @@
                 </a:solidFill>
               </a:rPr>
               <a:pPr/>
-              <a:t>9/19/2013</a:t>
+              <a:t>10/12/2013</a:t>
             </a:fld>
             <a:endParaRPr lang="en-US">
               <a:solidFill>
@@ -9954,7 +9869,7 @@
                 </a:solidFill>
               </a:rPr>
               <a:pPr/>
-              <a:t>9/19/2013</a:t>
+              <a:t>10/12/2013</a:t>
             </a:fld>
             <a:endParaRPr lang="en-US">
               <a:solidFill>
@@ -10274,7 +10189,7 @@
                 </a:solidFill>
               </a:rPr>
               <a:pPr/>
-              <a:t>9/19/2013</a:t>
+              <a:t>10/12/2013</a:t>
             </a:fld>
             <a:endParaRPr lang="en-US">
               <a:solidFill>
@@ -10728,7 +10643,7 @@
                 </a:solidFill>
               </a:rPr>
               <a:pPr/>
-              <a:t>9/19/2013</a:t>
+              <a:t>10/12/2013</a:t>
             </a:fld>
             <a:endParaRPr lang="en-US">
               <a:solidFill>
@@ -10878,7 +10793,7 @@
                 </a:solidFill>
               </a:rPr>
               <a:pPr/>
-              <a:t>9/19/2013</a:t>
+              <a:t>10/12/2013</a:t>
             </a:fld>
             <a:endParaRPr lang="en-US">
               <a:solidFill>
@@ -11005,7 +10920,7 @@
                 </a:solidFill>
               </a:rPr>
               <a:pPr/>
-              <a:t>9/19/2013</a:t>
+              <a:t>10/12/2013</a:t>
             </a:fld>
             <a:endParaRPr lang="en-US">
               <a:solidFill>
@@ -11314,7 +11229,7 @@
                 </a:solidFill>
               </a:rPr>
               <a:pPr/>
-              <a:t>9/19/2013</a:t>
+              <a:t>10/12/2013</a:t>
             </a:fld>
             <a:endParaRPr lang="en-US">
               <a:solidFill>
@@ -11509,7 +11424,7 @@
           <a:p>
             <a:fld id="{71EDC1E4-0993-46CC-9DA2-B47785EF46C1}" type="datetimeFigureOut">
               <a:rPr lang="en-GB" smtClean="0"/>
-              <a:t>19/09/2013</a:t>
+              <a:t>12/10/2013</a:t>
             </a:fld>
             <a:endParaRPr lang="en-GB"/>
           </a:p>
@@ -11769,7 +11684,7 @@
                 </a:solidFill>
               </a:rPr>
               <a:pPr/>
-              <a:t>9/19/2013</a:t>
+              <a:t>10/12/2013</a:t>
             </a:fld>
             <a:endParaRPr lang="en-US">
               <a:solidFill>
@@ -11971,7 +11886,7 @@
                 </a:solidFill>
               </a:rPr>
               <a:pPr/>
-              <a:t>9/19/2013</a:t>
+              <a:t>10/12/2013</a:t>
             </a:fld>
             <a:endParaRPr lang="en-US">
               <a:solidFill>
@@ -12183,7 +12098,7 @@
                 </a:solidFill>
               </a:rPr>
               <a:pPr/>
-              <a:t>9/19/2013</a:t>
+              <a:t>10/12/2013</a:t>
             </a:fld>
             <a:endParaRPr lang="en-US">
               <a:solidFill>
@@ -12454,7 +12369,7 @@
           <a:p>
             <a:fld id="{71EDC1E4-0993-46CC-9DA2-B47785EF46C1}" type="datetimeFigureOut">
               <a:rPr lang="en-GB" smtClean="0"/>
-              <a:t>19/09/2013</a:t>
+              <a:t>12/10/2013</a:t>
             </a:fld>
             <a:endParaRPr lang="en-GB"/>
           </a:p>
@@ -12686,7 +12601,7 @@
           <a:p>
             <a:fld id="{71EDC1E4-0993-46CC-9DA2-B47785EF46C1}" type="datetimeFigureOut">
               <a:rPr lang="en-GB" smtClean="0"/>
-              <a:t>19/09/2013</a:t>
+              <a:t>12/10/2013</a:t>
             </a:fld>
             <a:endParaRPr lang="en-GB"/>
           </a:p>
@@ -13053,7 +12968,7 @@
           <a:p>
             <a:fld id="{71EDC1E4-0993-46CC-9DA2-B47785EF46C1}" type="datetimeFigureOut">
               <a:rPr lang="en-GB" smtClean="0"/>
-              <a:t>19/09/2013</a:t>
+              <a:t>12/10/2013</a:t>
             </a:fld>
             <a:endParaRPr lang="en-GB"/>
           </a:p>
@@ -13171,7 +13086,7 @@
           <a:p>
             <a:fld id="{71EDC1E4-0993-46CC-9DA2-B47785EF46C1}" type="datetimeFigureOut">
               <a:rPr lang="en-GB" smtClean="0"/>
-              <a:t>19/09/2013</a:t>
+              <a:t>12/10/2013</a:t>
             </a:fld>
             <a:endParaRPr lang="en-GB"/>
           </a:p>
@@ -13266,7 +13181,7 @@
           <a:p>
             <a:fld id="{71EDC1E4-0993-46CC-9DA2-B47785EF46C1}" type="datetimeFigureOut">
               <a:rPr lang="en-GB" smtClean="0"/>
-              <a:t>19/09/2013</a:t>
+              <a:t>12/10/2013</a:t>
             </a:fld>
             <a:endParaRPr lang="en-GB"/>
           </a:p>
@@ -13543,7 +13458,7 @@
           <a:p>
             <a:fld id="{71EDC1E4-0993-46CC-9DA2-B47785EF46C1}" type="datetimeFigureOut">
               <a:rPr lang="en-GB" smtClean="0"/>
-              <a:t>19/09/2013</a:t>
+              <a:t>12/10/2013</a:t>
             </a:fld>
             <a:endParaRPr lang="en-GB"/>
           </a:p>
@@ -13796,7 +13711,7 @@
           <a:p>
             <a:fld id="{71EDC1E4-0993-46CC-9DA2-B47785EF46C1}" type="datetimeFigureOut">
               <a:rPr lang="en-GB" smtClean="0"/>
-              <a:t>19/09/2013</a:t>
+              <a:t>12/10/2013</a:t>
             </a:fld>
             <a:endParaRPr lang="en-GB"/>
           </a:p>
@@ -14009,7 +13924,7 @@
           <a:p>
             <a:fld id="{71EDC1E4-0993-46CC-9DA2-B47785EF46C1}" type="datetimeFigureOut">
               <a:rPr lang="en-GB" smtClean="0"/>
-              <a:t>19/09/2013</a:t>
+              <a:t>12/10/2013</a:t>
             </a:fld>
             <a:endParaRPr lang="en-GB"/>
           </a:p>
@@ -14556,7 +14471,7 @@
                 </a:solidFill>
               </a:rPr>
               <a:pPr/>
-              <a:t>9/19/2013</a:t>
+              <a:t>10/12/2013</a:t>
             </a:fld>
             <a:endParaRPr lang="en-US">
               <a:solidFill>
@@ -16451,9 +16366,15 @@
               <a:rPr lang="en-GB" sz="3600" dirty="0">
                 <a:hlinkClick r:id="rId3"/>
               </a:rPr>
-              <a:t>https://github.com/phonegap/phonegap-plugins</a:t>
-            </a:r>
-            <a:endParaRPr lang="en-GB" sz="3600" dirty="0"/>
+              <a:t>http://plugins.cordova.io</a:t>
+            </a:r>
+            <a:r>
+              <a:rPr lang="en-GB" sz="3600" dirty="0" smtClean="0">
+                <a:hlinkClick r:id="rId3"/>
+              </a:rPr>
+              <a:t>/</a:t>
+            </a:r>
+            <a:endParaRPr lang="en-GB" sz="3600" dirty="0" smtClean="0"/>
           </a:p>
         </p:txBody>
       </p:sp>
@@ -17454,7 +17375,7 @@
         <p:spPr/>
         <p:txBody>
           <a:bodyPr>
-            <a:normAutofit lnSpcReduction="10000"/>
+            <a:normAutofit/>
           </a:bodyPr>
           <a:lstStyle/>
           <a:p>
@@ -17462,48 +17383,84 @@
               <a:rPr lang="en-GB" u="sng" dirty="0">
                 <a:hlinkClick r:id="rId3"/>
               </a:rPr>
-              <a:t>http://msdn.microsoft.com/en-us/library/windowsphone/develop/jj681690(v=vs.105).aspx</a:t>
+              <a:t>http://bit.ly/1efcr1d</a:t>
+            </a:r>
+            <a:r>
+              <a:rPr lang="en-GB" dirty="0" smtClean="0"/>
+              <a:t> </a:t>
             </a:r>
             <a:r>
               <a:rPr lang="en-GB" dirty="0"/>
-              <a:t> - Windows Phone 8 and Windows 8 platform comparison</a:t>
-            </a:r>
+              <a:t>- Windows Phone 8 and Windows 8 platform </a:t>
+            </a:r>
+            <a:r>
+              <a:rPr lang="en-GB" dirty="0" smtClean="0"/>
+              <a:t>comparison (MSDN)</a:t>
+            </a:r>
+            <a:endParaRPr lang="en-GB" dirty="0"/>
           </a:p>
           <a:p>
             <a:r>
               <a:rPr lang="en-GB" u="sng" dirty="0">
                 <a:hlinkClick r:id="rId4"/>
               </a:rPr>
-              <a:t>http://msdn.microsoft.com/library/windowsphone/develop/jj714089(v=vs.105).aspx</a:t>
+              <a:t>http://bit.ly/18WA7oU</a:t>
+            </a:r>
+            <a:r>
+              <a:rPr lang="en-GB" dirty="0" smtClean="0"/>
+              <a:t> </a:t>
             </a:r>
             <a:r>
               <a:rPr lang="en-GB" dirty="0"/>
-              <a:t> - Windows Phone 8 and Windows 8 app development</a:t>
-            </a:r>
+              <a:t>- Windows Phone 8 and Windows 8 app </a:t>
+            </a:r>
+            <a:r>
+              <a:rPr lang="en-GB" dirty="0" smtClean="0"/>
+              <a:t>development (MSDN)</a:t>
+            </a:r>
+            <a:endParaRPr lang="en-GB" dirty="0"/>
           </a:p>
           <a:p>
             <a:r>
               <a:rPr lang="en-GB" u="sng" dirty="0">
                 <a:hlinkClick r:id="rId5"/>
               </a:rPr>
-              <a:t>http://msdn.microsoft.com/en-us/library/windowsphone/develop/jj721614(v=vs.105).aspx</a:t>
+              <a:t>http://bit.ly/GQuOxU</a:t>
+            </a:r>
+            <a:r>
+              <a:rPr lang="en-GB" dirty="0" smtClean="0"/>
+              <a:t> </a:t>
             </a:r>
             <a:r>
               <a:rPr lang="en-GB" dirty="0"/>
-              <a:t> - Handling Windows Phone 8 and Windows 8 platform differences</a:t>
-            </a:r>
+              <a:t>- Handling Windows Phone 8 and Windows 8 platform </a:t>
+            </a:r>
+            <a:r>
+              <a:rPr lang="en-GB" dirty="0" smtClean="0"/>
+              <a:t>differences (MSDN)</a:t>
+            </a:r>
+            <a:endParaRPr lang="en-GB" dirty="0"/>
           </a:p>
           <a:p>
             <a:r>
               <a:rPr lang="en-GB" u="sng" dirty="0">
                 <a:hlinkClick r:id="rId6"/>
               </a:rPr>
-              <a:t>http://channel9.msdn.com/Series/Building-Apps-for-Both-Windows-8-and-Windows-Phone-8-Jump-Start</a:t>
+              <a:t>http://bit.ly/1605aCh</a:t>
+            </a:r>
+            <a:r>
+              <a:rPr lang="en-GB" dirty="0" smtClean="0"/>
+              <a:t> - Building </a:t>
             </a:r>
             <a:r>
               <a:rPr lang="en-GB" dirty="0"/>
-              <a:t> - Channel 9 - Building Apps for Both Windows 8 and Windows Phone 8 Jump Start</a:t>
-            </a:r>
+              <a:t>Apps for Both Windows 8 and Windows Phone 8 Jump </a:t>
+            </a:r>
+            <a:r>
+              <a:rPr lang="en-GB" dirty="0" smtClean="0"/>
+              <a:t>Start (Channel 9)</a:t>
+            </a:r>
+            <a:endParaRPr lang="en-GB" dirty="0"/>
           </a:p>
         </p:txBody>
       </p:sp>
@@ -18010,61 +17967,31 @@
             <p:ph type="title"/>
           </p:nvPr>
         </p:nvSpPr>
-        <p:spPr/>
-        <p:txBody>
-          <a:bodyPr/>
+        <p:spPr>
+          <a:xfrm>
+            <a:off x="838200" y="2382180"/>
+            <a:ext cx="10515600" cy="1325563"/>
+          </a:xfrm>
+        </p:spPr>
+        <p:txBody>
+          <a:bodyPr>
+            <a:normAutofit/>
+          </a:bodyPr>
           <a:lstStyle/>
           <a:p>
-            <a:r>
-              <a:rPr lang="en-GB" dirty="0" smtClean="0"/>
-              <a:t>Demo Resources</a:t>
-            </a:r>
-            <a:endParaRPr lang="en-GB" dirty="0"/>
-          </a:p>
-        </p:txBody>
-      </p:sp>
-      <p:sp>
-        <p:nvSpPr>
-          <p:cNvPr id="3" name="Content Placeholder 2"/>
-          <p:cNvSpPr>
-            <a:spLocks noGrp="1"/>
-          </p:cNvSpPr>
-          <p:nvPr>
-            <p:ph idx="1"/>
-          </p:nvPr>
-        </p:nvSpPr>
-        <p:spPr/>
-        <p:txBody>
-          <a:bodyPr/>
-          <a:lstStyle/>
-          <a:p>
-            <a:r>
-              <a:rPr lang="en-GB" dirty="0" smtClean="0"/>
-              <a:t>TODO: Link to accelerometer sample</a:t>
-            </a:r>
-          </a:p>
-          <a:p>
-            <a:r>
-              <a:rPr lang="en-GB" dirty="0" smtClean="0"/>
-              <a:t>TODO: Link to Azure Mobile Services sample</a:t>
-            </a:r>
-          </a:p>
-          <a:p>
-            <a:r>
-              <a:rPr lang="en-GB" dirty="0" smtClean="0"/>
-              <a:t>TODO: Links to Nomad sample </a:t>
-            </a:r>
-            <a:r>
-              <a:rPr lang="en-GB" dirty="0" smtClean="0"/>
-              <a:t>apps</a:t>
-            </a:r>
+            <a:pPr algn="ctr"/>
+            <a:r>
+              <a:rPr lang="en-GB" sz="7200" dirty="0" smtClean="0"/>
+              <a:t>App Store Publishing</a:t>
+            </a:r>
+            <a:endParaRPr lang="en-GB" sz="7200" dirty="0"/>
           </a:p>
         </p:txBody>
       </p:sp>
     </p:spTree>
     <p:extLst>
       <p:ext uri="{BB962C8B-B14F-4D97-AF65-F5344CB8AC3E}">
-        <p14:creationId xmlns:p14="http://schemas.microsoft.com/office/powerpoint/2010/main" val="1567643292"/>
+        <p14:creationId xmlns:p14="http://schemas.microsoft.com/office/powerpoint/2010/main" val="1765224941"/>
       </p:ext>
     </p:extLst>
   </p:cSld>
@@ -18108,31 +18035,110 @@
             <p:ph type="title"/>
           </p:nvPr>
         </p:nvSpPr>
-        <p:spPr>
-          <a:xfrm>
-            <a:off x="838200" y="2382180"/>
-            <a:ext cx="10515600" cy="1325563"/>
-          </a:xfrm>
-        </p:spPr>
-        <p:txBody>
-          <a:bodyPr>
-            <a:normAutofit/>
-          </a:bodyPr>
+        <p:spPr/>
+        <p:txBody>
+          <a:bodyPr/>
           <a:lstStyle/>
           <a:p>
-            <a:pPr algn="ctr"/>
-            <a:r>
-              <a:rPr lang="en-GB" sz="7200" dirty="0" smtClean="0"/>
-              <a:t>App Store Publishing</a:t>
-            </a:r>
-            <a:endParaRPr lang="en-GB" sz="7200" dirty="0"/>
+            <a:r>
+              <a:rPr lang="en-GB" dirty="0" smtClean="0"/>
+              <a:t>Coming soon to Nomad…</a:t>
+            </a:r>
+            <a:endParaRPr lang="en-GB" dirty="0"/>
+          </a:p>
+        </p:txBody>
+      </p:sp>
+      <p:sp>
+        <p:nvSpPr>
+          <p:cNvPr id="3" name="Content Placeholder 2"/>
+          <p:cNvSpPr>
+            <a:spLocks noGrp="1"/>
+          </p:cNvSpPr>
+          <p:nvPr>
+            <p:ph idx="1"/>
+          </p:nvPr>
+        </p:nvSpPr>
+        <p:spPr/>
+        <p:txBody>
+          <a:bodyPr/>
+          <a:lstStyle/>
+          <a:p>
+            <a:r>
+              <a:rPr lang="en-GB" dirty="0" smtClean="0"/>
+              <a:t>On-device debugging</a:t>
+            </a:r>
+          </a:p>
+          <a:p>
+            <a:r>
+              <a:rPr lang="en-GB" dirty="0"/>
+              <a:t>A FREE version of the </a:t>
+            </a:r>
+            <a:r>
+              <a:rPr lang="en-GB" dirty="0" smtClean="0"/>
+              <a:t>service</a:t>
+            </a:r>
+          </a:p>
+          <a:p>
+            <a:r>
+              <a:rPr lang="en-GB" dirty="0" smtClean="0"/>
+              <a:t>Cordova plug-in </a:t>
+            </a:r>
+            <a:r>
+              <a:rPr lang="en-GB" dirty="0" smtClean="0"/>
+              <a:t>support (already in </a:t>
+            </a:r>
+            <a:r>
+              <a:rPr lang="en-GB" dirty="0" err="1" smtClean="0"/>
+              <a:t>Icenium</a:t>
+            </a:r>
+            <a:r>
+              <a:rPr lang="en-GB" dirty="0" smtClean="0"/>
+              <a:t>)</a:t>
+            </a:r>
+            <a:endParaRPr lang="en-GB" dirty="0" smtClean="0"/>
+          </a:p>
+          <a:p>
+            <a:pPr lvl="1"/>
+            <a:r>
+              <a:rPr lang="en-GB" dirty="0" err="1" smtClean="0"/>
+              <a:t>PushNotification</a:t>
+            </a:r>
+            <a:endParaRPr lang="en-GB" dirty="0" smtClean="0"/>
+          </a:p>
+          <a:p>
+            <a:pPr lvl="1"/>
+            <a:r>
+              <a:rPr lang="en-GB" dirty="0" err="1" smtClean="0"/>
+              <a:t>BarcodeScanner</a:t>
+            </a:r>
+            <a:endParaRPr lang="en-GB" dirty="0" smtClean="0"/>
+          </a:p>
+          <a:p>
+            <a:pPr lvl="1"/>
+            <a:r>
+              <a:rPr lang="en-GB" dirty="0" smtClean="0"/>
+              <a:t>Etc., see </a:t>
+            </a:r>
+            <a:r>
+              <a:rPr lang="en-GB" dirty="0">
+                <a:hlinkClick r:id="rId3"/>
+              </a:rPr>
+              <a:t>http://plugins.cordova.io/</a:t>
+            </a:r>
+            <a:endParaRPr lang="en-GB" dirty="0" smtClean="0"/>
+          </a:p>
+          <a:p>
+            <a:r>
+              <a:rPr lang="en-GB" dirty="0" smtClean="0"/>
+              <a:t>Windows Phone 8 support</a:t>
+            </a:r>
           </a:p>
         </p:txBody>
       </p:sp>
     </p:spTree>
     <p:extLst>
       <p:ext uri="{BB962C8B-B14F-4D97-AF65-F5344CB8AC3E}">
-        <p14:creationId xmlns:p14="http://schemas.microsoft.com/office/powerpoint/2010/main" val="1765224941"/>
+        <p14:creationId xmlns:p14="http://schemas.microsoft.com/office/powerpoint/2010/main" val="1032436737"/>
       </p:ext>
     </p:extLst>
   </p:cSld>
@@ -18183,7 +18189,7 @@
           <a:p>
             <a:r>
               <a:rPr lang="en-GB" dirty="0" smtClean="0"/>
-              <a:t>Coming soon to Nomad…</a:t>
+              <a:t>Contacts &amp; Resources</a:t>
             </a:r>
             <a:endParaRPr lang="en-GB" dirty="0"/>
           </a:p>
@@ -18206,146 +18212,12 @@
           <a:p>
             <a:r>
               <a:rPr lang="en-GB" dirty="0" smtClean="0"/>
-              <a:t>On-device debugging</a:t>
-            </a:r>
-          </a:p>
-          <a:p>
-            <a:r>
-              <a:rPr lang="en-GB" dirty="0"/>
-              <a:t>A FREE version of the </a:t>
-            </a:r>
-            <a:r>
-              <a:rPr lang="en-GB" dirty="0" smtClean="0"/>
-              <a:t>service</a:t>
-            </a:r>
-          </a:p>
-          <a:p>
-            <a:r>
-              <a:rPr lang="en-GB" dirty="0" smtClean="0"/>
-              <a:t>Cordova plug-in support</a:t>
-            </a:r>
-          </a:p>
-          <a:p>
-            <a:pPr lvl="1"/>
-            <a:r>
-              <a:rPr lang="en-GB" dirty="0" err="1" smtClean="0"/>
-              <a:t>PushNotification</a:t>
-            </a:r>
-            <a:endParaRPr lang="en-GB" dirty="0" smtClean="0"/>
-          </a:p>
-          <a:p>
-            <a:pPr lvl="1"/>
-            <a:r>
-              <a:rPr lang="en-GB" dirty="0" err="1" smtClean="0"/>
-              <a:t>BarcodeScanner</a:t>
-            </a:r>
-            <a:endParaRPr lang="en-GB" dirty="0" smtClean="0"/>
-          </a:p>
-          <a:p>
-            <a:pPr lvl="1"/>
-            <a:r>
-              <a:rPr lang="en-GB" dirty="0" smtClean="0"/>
-              <a:t>Etc., see </a:t>
+              <a:t>Nomad for Visual Studio - </a:t>
             </a:r>
             <a:r>
               <a:rPr lang="en-GB" dirty="0">
                 <a:hlinkClick r:id="rId3"/>
               </a:rPr>
-              <a:t>https://github.com/phonegap/phonegap-plugins</a:t>
-            </a:r>
-            <a:endParaRPr lang="en-GB" dirty="0" smtClean="0"/>
-          </a:p>
-          <a:p>
-            <a:r>
-              <a:rPr lang="en-GB" dirty="0" smtClean="0"/>
-              <a:t>Windows Phone 8 support</a:t>
-            </a:r>
-          </a:p>
-        </p:txBody>
-      </p:sp>
-    </p:spTree>
-    <p:extLst>
-      <p:ext uri="{BB962C8B-B14F-4D97-AF65-F5344CB8AC3E}">
-        <p14:creationId xmlns:p14="http://schemas.microsoft.com/office/powerpoint/2010/main" val="1032436737"/>
-      </p:ext>
-    </p:extLst>
-  </p:cSld>
-  <p:clrMapOvr>
-    <a:masterClrMapping/>
-  </p:clrMapOvr>
-  <p:timing>
-    <p:tnLst>
-      <p:par>
-        <p:cTn id="1" dur="indefinite" restart="never" nodeType="tmRoot"/>
-      </p:par>
-    </p:tnLst>
-  </p:timing>
-</p:sld>
-</file>
-
-<file path=ppt/slides/slide28.xml><?xml version="1.0" encoding="utf-8"?>
-<p:sld xmlns:a="http://schemas.openxmlformats.org/drawingml/2006/main" xmlns:r="http://schemas.openxmlformats.org/officeDocument/2006/relationships" xmlns:p="http://schemas.openxmlformats.org/presentationml/2006/main">
-  <p:cSld>
-    <p:spTree>
-      <p:nvGrpSpPr>
-        <p:cNvPr id="1" name=""/>
-        <p:cNvGrpSpPr/>
-        <p:nvPr/>
-      </p:nvGrpSpPr>
-      <p:grpSpPr>
-        <a:xfrm>
-          <a:off x="0" y="0"/>
-          <a:ext cx="0" cy="0"/>
-          <a:chOff x="0" y="0"/>
-          <a:chExt cx="0" cy="0"/>
-        </a:xfrm>
-      </p:grpSpPr>
-      <p:sp>
-        <p:nvSpPr>
-          <p:cNvPr id="2" name="Title 1"/>
-          <p:cNvSpPr>
-            <a:spLocks noGrp="1"/>
-          </p:cNvSpPr>
-          <p:nvPr>
-            <p:ph type="title"/>
-          </p:nvPr>
-        </p:nvSpPr>
-        <p:spPr/>
-        <p:txBody>
-          <a:bodyPr/>
-          <a:lstStyle/>
-          <a:p>
-            <a:r>
-              <a:rPr lang="en-GB" dirty="0" smtClean="0"/>
-              <a:t>Contacts &amp; Resources</a:t>
-            </a:r>
-            <a:endParaRPr lang="en-GB" dirty="0"/>
-          </a:p>
-        </p:txBody>
-      </p:sp>
-      <p:sp>
-        <p:nvSpPr>
-          <p:cNvPr id="3" name="Content Placeholder 2"/>
-          <p:cNvSpPr>
-            <a:spLocks noGrp="1"/>
-          </p:cNvSpPr>
-          <p:nvPr>
-            <p:ph idx="1"/>
-          </p:nvPr>
-        </p:nvSpPr>
-        <p:spPr/>
-        <p:txBody>
-          <a:bodyPr/>
-          <a:lstStyle/>
-          <a:p>
-            <a:r>
-              <a:rPr lang="en-GB" dirty="0" smtClean="0"/>
-              <a:t>Nomad for Visual Studio - </a:t>
-            </a:r>
-            <a:r>
-              <a:rPr lang="en-GB" dirty="0">
-                <a:hlinkClick r:id="rId3"/>
-              </a:rPr>
               <a:t>http://vsnomad.com/</a:t>
             </a:r>
             <a:endParaRPr lang="en-GB" dirty="0" smtClean="0"/>
@@ -18372,25 +18244,65 @@
           </a:p>
           <a:p>
             <a:r>
+              <a:rPr lang="en-GB" dirty="0" smtClean="0"/>
+              <a:t>Slides (</a:t>
+            </a:r>
+            <a:r>
+              <a:rPr lang="en-GB" dirty="0" err="1" smtClean="0"/>
+              <a:t>GitHub</a:t>
+            </a:r>
+            <a:r>
+              <a:rPr lang="en-GB" dirty="0" smtClean="0"/>
+              <a:t>): </a:t>
+            </a:r>
+            <a:r>
+              <a:rPr lang="en-GB" dirty="0">
+                <a:hlinkClick r:id="rId5"/>
+              </a:rPr>
+              <a:t>http://</a:t>
+            </a:r>
+            <a:r>
               <a:rPr lang="en-GB" dirty="0" smtClean="0">
                 <a:hlinkClick r:id="rId5"/>
               </a:rPr>
-              <a:t>https://github.com/bartread</a:t>
-            </a:r>
-            <a:endParaRPr lang="en-GB" dirty="0" smtClean="0"/>
+              <a:t>bit.ly/GQtGuc</a:t>
+            </a:r>
+            <a:endParaRPr lang="en-GB" dirty="0"/>
           </a:p>
           <a:p>
             <a:r>
               <a:rPr lang="en-GB" dirty="0" smtClean="0"/>
-              <a:t>Using Nomad to create an app with Azure Mobile Services: </a:t>
+              <a:t>Using </a:t>
+            </a:r>
+            <a:r>
+              <a:rPr lang="en-GB" dirty="0" smtClean="0"/>
+              <a:t>Nomad to create an app with Azure Mobile </a:t>
+            </a:r>
+            <a:r>
+              <a:rPr lang="en-GB" dirty="0" smtClean="0"/>
+              <a:t>Services (</a:t>
+            </a:r>
+            <a:r>
+              <a:rPr lang="en-GB" dirty="0" err="1" smtClean="0"/>
+              <a:t>CodeProject</a:t>
+            </a:r>
+            <a:r>
+              <a:rPr lang="en-GB" dirty="0"/>
+              <a:t>): </a:t>
             </a:r>
             <a:r>
               <a:rPr lang="en-GB" dirty="0">
                 <a:hlinkClick r:id="rId6"/>
               </a:rPr>
-              <a:t>http://www.codeproject.com/Articles/585792/Android-and-iOS-Mobile-Device-Development-with-Azu</a:t>
-            </a:r>
-            <a:endParaRPr lang="en-GB" dirty="0"/>
+              <a:t>http://</a:t>
+            </a:r>
+            <a:r>
+              <a:rPr lang="en-GB" dirty="0" smtClean="0">
+                <a:hlinkClick r:id="rId6"/>
+              </a:rPr>
+              <a:t>bit.ly/GHMA5N</a:t>
+            </a:r>
+            <a:endParaRPr lang="en-GB" dirty="0" smtClean="0"/>
           </a:p>
         </p:txBody>
       </p:sp>
@@ -19723,7 +19635,7 @@
         </p:blipFill>
         <p:spPr>
           <a:xfrm>
-            <a:off x="1527967" y="4278289"/>
+            <a:off x="482939" y="4278289"/>
             <a:ext cx="4488256" cy="1174513"/>
           </a:xfrm>
           <a:prstGeom prst="rect">
@@ -19754,7 +19666,7 @@
         </p:blipFill>
         <p:spPr bwMode="auto">
           <a:xfrm>
-            <a:off x="8438536" y="3810647"/>
+            <a:off x="9334272" y="3885291"/>
             <a:ext cx="2255972" cy="2014261"/>
           </a:xfrm>
           <a:prstGeom prst="rect">
@@ -19797,6 +19709,49 @@
           <a:xfrm>
             <a:off x="389275" y="695458"/>
             <a:ext cx="11634829" cy="3258355"/>
+          </a:xfrm>
+          <a:prstGeom prst="rect">
+            <a:avLst/>
+          </a:prstGeom>
+          <a:noFill/>
+          <a:extLst>
+            <a:ext uri="{909E8E84-426E-40DD-AFC4-6F175D3DCCD1}">
+              <a14:hiddenFill xmlns:a14="http://schemas.microsoft.com/office/drawing/2010/main">
+                <a:solidFill>
+                  <a:srgbClr val="FFFFFF"/>
+                </a:solidFill>
+              </a14:hiddenFill>
+            </a:ext>
+          </a:extLst>
+        </p:spPr>
+      </p:pic>
+      <p:pic>
+        <p:nvPicPr>
+          <p:cNvPr id="5" name="Picture 2" descr="http://ww1.prweb.com/prfiles/2012/10/21/10077323/gI_94658_Icenium%20logo.png"/>
+          <p:cNvPicPr>
+            <a:picLocks noGrp="1" noChangeAspect="1" noChangeArrowheads="1"/>
+          </p:cNvPicPr>
+          <p:nvPr>
+            <p:ph idx="1"/>
+          </p:nvPr>
+        </p:nvPicPr>
+        <p:blipFill>
+          <a:blip r:embed="rId6">
+            <a:extLst>
+              <a:ext uri="{28A0092B-C50C-407E-A947-70E740481C1C}">
+                <a14:useLocalDpi xmlns:a14="http://schemas.microsoft.com/office/drawing/2010/main" val="0"/>
+              </a:ext>
+            </a:extLst>
+          </a:blip>
+          <a:srcRect/>
+          <a:stretch>
+            <a:fillRect/>
+          </a:stretch>
+        </p:blipFill>
+        <p:spPr bwMode="auto">
+          <a:xfrm>
+            <a:off x="6291477" y="4338264"/>
+            <a:ext cx="1858858" cy="996348"/>
           </a:xfrm>
           <a:prstGeom prst="rect">
             <a:avLst/>

</xml_diff>

<commit_message>
Few more tweaks - added more Icenium references to slides.
</commit_message>
<xml_diff>
--- a/Talks/Cross-Platform Mobile Development in Visual Studio.pptx
+++ b/Talks/Cross-Platform Mobile Development in Visual Studio.pptx
@@ -3280,7 +3280,67 @@
                 <a:ea typeface="+mn-ea"/>
                 <a:cs typeface="+mn-cs"/>
               </a:rPr>
-              <a:t>This is where Nomad comes in. Nomad is a solution for creating cross-platform mobile apps built on top of Cordova from within Visual Studio. It supports both </a:t>
+              <a:t>This is where Nomad </a:t>
+            </a:r>
+            <a:r>
+              <a:rPr lang="en-GB" sz="1200" b="0" i="0" u="none" strike="noStrike" kern="1200" dirty="0" smtClean="0">
+                <a:solidFill>
+                  <a:schemeClr val="tx1"/>
+                </a:solidFill>
+                <a:effectLst/>
+                <a:latin typeface="+mn-lt"/>
+                <a:ea typeface="+mn-ea"/>
+                <a:cs typeface="+mn-cs"/>
+              </a:rPr>
+              <a:t>and</a:t>
+            </a:r>
+            <a:r>
+              <a:rPr lang="en-GB" sz="1200" b="0" i="0" u="none" strike="noStrike" kern="1200" baseline="0" dirty="0" smtClean="0">
+                <a:solidFill>
+                  <a:schemeClr val="tx1"/>
+                </a:solidFill>
+                <a:effectLst/>
+                <a:latin typeface="+mn-lt"/>
+                <a:ea typeface="+mn-ea"/>
+                <a:cs typeface="+mn-cs"/>
+              </a:rPr>
+              <a:t> </a:t>
+            </a:r>
+            <a:r>
+              <a:rPr lang="en-GB" sz="1200" b="0" i="0" u="none" strike="noStrike" kern="1200" baseline="0" dirty="0" err="1" smtClean="0">
+                <a:solidFill>
+                  <a:schemeClr val="tx1"/>
+                </a:solidFill>
+                <a:effectLst/>
+                <a:latin typeface="+mn-lt"/>
+                <a:ea typeface="+mn-ea"/>
+                <a:cs typeface="+mn-cs"/>
+              </a:rPr>
+              <a:t>Icenium</a:t>
+            </a:r>
+            <a:r>
+              <a:rPr lang="en-GB" sz="1200" b="0" i="0" u="none" strike="noStrike" kern="1200" dirty="0" smtClean="0">
+                <a:solidFill>
+                  <a:schemeClr val="tx1"/>
+                </a:solidFill>
+                <a:effectLst/>
+                <a:latin typeface="+mn-lt"/>
+                <a:ea typeface="+mn-ea"/>
+                <a:cs typeface="+mn-cs"/>
+              </a:rPr>
+              <a:t>. </a:t>
+            </a:r>
+            <a:r>
+              <a:rPr lang="en-GB" sz="1200" b="0" i="0" u="none" strike="noStrike" kern="1200" dirty="0" smtClean="0">
+                <a:solidFill>
+                  <a:schemeClr val="tx1"/>
+                </a:solidFill>
+                <a:effectLst/>
+                <a:latin typeface="+mn-lt"/>
+                <a:ea typeface="+mn-ea"/>
+                <a:cs typeface="+mn-cs"/>
+              </a:rPr>
+              <a:t>Nomad is a solution for creating cross-platform mobile apps built on top of Cordova from within Visual Studio. It supports both </a:t>
             </a:r>
             <a:r>
               <a:rPr lang="en-GB" sz="1200" b="0" i="0" u="none" strike="noStrike" kern="1200" dirty="0" err="1" smtClean="0">
@@ -3316,7 +3376,67 @@
                 <a:ea typeface="+mn-ea"/>
                 <a:cs typeface="+mn-cs"/>
               </a:rPr>
-              <a:t> and will soon support Windows Phone 8 as well.</a:t>
+              <a:t> and will soon support Windows Phone 8 as well</a:t>
+            </a:r>
+            <a:r>
+              <a:rPr lang="en-GB" sz="1200" b="0" i="0" u="none" strike="noStrike" kern="1200" baseline="0" dirty="0" smtClean="0">
+                <a:solidFill>
+                  <a:schemeClr val="tx1"/>
+                </a:solidFill>
+                <a:effectLst/>
+                <a:latin typeface="+mn-lt"/>
+                <a:ea typeface="+mn-ea"/>
+                <a:cs typeface="+mn-cs"/>
+              </a:rPr>
+              <a:t>. As I said, </a:t>
+            </a:r>
+            <a:r>
+              <a:rPr lang="en-GB" sz="1200" b="0" i="0" u="none" strike="noStrike" kern="1200" baseline="0" dirty="0" err="1" smtClean="0">
+                <a:solidFill>
+                  <a:schemeClr val="tx1"/>
+                </a:solidFill>
+                <a:effectLst/>
+                <a:latin typeface="+mn-lt"/>
+                <a:ea typeface="+mn-ea"/>
+                <a:cs typeface="+mn-cs"/>
+              </a:rPr>
+              <a:t>Icenium</a:t>
+            </a:r>
+            <a:r>
+              <a:rPr lang="en-GB" sz="1200" b="0" i="0" u="none" strike="noStrike" kern="1200" baseline="0" dirty="0" smtClean="0">
+                <a:solidFill>
+                  <a:schemeClr val="tx1"/>
+                </a:solidFill>
+                <a:effectLst/>
+                <a:latin typeface="+mn-lt"/>
+                <a:ea typeface="+mn-ea"/>
+                <a:cs typeface="+mn-cs"/>
+              </a:rPr>
+              <a:t> does the same and also currently supports only </a:t>
+            </a:r>
+            <a:r>
+              <a:rPr lang="en-GB" sz="1200" b="0" i="0" u="none" strike="noStrike" kern="1200" baseline="0" dirty="0" err="1" smtClean="0">
+                <a:solidFill>
+                  <a:schemeClr val="tx1"/>
+                </a:solidFill>
+                <a:effectLst/>
+                <a:latin typeface="+mn-lt"/>
+                <a:ea typeface="+mn-ea"/>
+                <a:cs typeface="+mn-cs"/>
+              </a:rPr>
+              <a:t>iOS</a:t>
+            </a:r>
+            <a:r>
+              <a:rPr lang="en-GB" sz="1200" b="0" i="0" u="none" strike="noStrike" kern="1200" baseline="0" dirty="0" smtClean="0">
+                <a:solidFill>
+                  <a:schemeClr val="tx1"/>
+                </a:solidFill>
+                <a:effectLst/>
+                <a:latin typeface="+mn-lt"/>
+                <a:ea typeface="+mn-ea"/>
+                <a:cs typeface="+mn-cs"/>
+              </a:rPr>
+              <a:t> and Android.</a:t>
             </a:r>
             <a:endParaRPr lang="en-GB" dirty="0"/>
           </a:p>
@@ -16469,8 +16589,32 @@
         </p:blipFill>
         <p:spPr>
           <a:xfrm>
-            <a:off x="573935" y="0"/>
-            <a:ext cx="11044129" cy="6858000"/>
+            <a:off x="723225" y="186611"/>
+            <a:ext cx="6181428" cy="3838441"/>
+          </a:xfrm>
+          <a:prstGeom prst="rect">
+            <a:avLst/>
+          </a:prstGeom>
+        </p:spPr>
+      </p:pic>
+      <p:pic>
+        <p:nvPicPr>
+          <p:cNvPr id="5" name="Picture 4"/>
+          <p:cNvPicPr>
+            <a:picLocks noChangeAspect="1"/>
+          </p:cNvPicPr>
+          <p:nvPr/>
+        </p:nvPicPr>
+        <p:blipFill>
+          <a:blip r:embed="rId4"/>
+          <a:stretch>
+            <a:fillRect/>
+          </a:stretch>
+        </p:blipFill>
+        <p:spPr>
+          <a:xfrm>
+            <a:off x="5415797" y="3582954"/>
+            <a:ext cx="6004001" cy="3104858"/>
           </a:xfrm>
           <a:prstGeom prst="rect">
             <a:avLst/>
@@ -17011,12 +17155,53 @@
         </p:blipFill>
         <p:spPr>
           <a:xfrm>
-            <a:off x="3615760" y="74078"/>
+            <a:off x="928550" y="111400"/>
             <a:ext cx="4488256" cy="1174513"/>
           </a:xfrm>
           <a:prstGeom prst="rect">
             <a:avLst/>
           </a:prstGeom>
+        </p:spPr>
+      </p:pic>
+      <p:pic>
+        <p:nvPicPr>
+          <p:cNvPr id="9" name="Picture 2" descr="http://ww1.prweb.com/prfiles/2012/10/21/10077323/gI_94658_Icenium%20logo.png"/>
+          <p:cNvPicPr>
+            <a:picLocks noChangeAspect="1" noChangeArrowheads="1"/>
+          </p:cNvPicPr>
+          <p:nvPr/>
+        </p:nvPicPr>
+        <p:blipFill>
+          <a:blip r:embed="rId4">
+            <a:extLst>
+              <a:ext uri="{28A0092B-C50C-407E-A947-70E740481C1C}">
+                <a14:useLocalDpi xmlns:a14="http://schemas.microsoft.com/office/drawing/2010/main" val="0"/>
+              </a:ext>
+            </a:extLst>
+          </a:blip>
+          <a:srcRect/>
+          <a:stretch>
+            <a:fillRect/>
+          </a:stretch>
+        </p:blipFill>
+        <p:spPr bwMode="auto">
+          <a:xfrm>
+            <a:off x="9357799" y="163160"/>
+            <a:ext cx="1858858" cy="996348"/>
+          </a:xfrm>
+          <a:prstGeom prst="rect">
+            <a:avLst/>
+          </a:prstGeom>
+          <a:noFill/>
+          <a:extLst>
+            <a:ext uri="{909E8E84-426E-40DD-AFC4-6F175D3DCCD1}">
+              <a14:hiddenFill xmlns:a14="http://schemas.microsoft.com/office/drawing/2010/main">
+                <a:solidFill>
+                  <a:srgbClr val="FFFFFF"/>
+                </a:solidFill>
+              </a14:hiddenFill>
+            </a:ext>
+          </a:extLst>
         </p:spPr>
       </p:pic>
     </p:spTree>
@@ -18081,11 +18266,7 @@
           <a:p>
             <a:r>
               <a:rPr lang="en-GB" dirty="0" smtClean="0"/>
-              <a:t>Cordova plug-in </a:t>
-            </a:r>
-            <a:r>
-              <a:rPr lang="en-GB" dirty="0" smtClean="0"/>
-              <a:t>support (already in </a:t>
+              <a:t>Cordova plug-in support (already in </a:t>
             </a:r>
             <a:r>
               <a:rPr lang="en-GB" dirty="0" err="1" smtClean="0"/>
@@ -18095,7 +18276,6 @@
               <a:rPr lang="en-GB" dirty="0" smtClean="0"/>
               <a:t>)</a:t>
             </a:r>
-            <a:endParaRPr lang="en-GB" dirty="0" smtClean="0"/>
           </a:p>
           <a:p>
             <a:pPr lvl="1"/>
@@ -18272,15 +18452,7 @@
           <a:p>
             <a:r>
               <a:rPr lang="en-GB" dirty="0" smtClean="0"/>
-              <a:t>Using </a:t>
-            </a:r>
-            <a:r>
-              <a:rPr lang="en-GB" dirty="0" smtClean="0"/>
-              <a:t>Nomad to create an app with Azure Mobile </a:t>
-            </a:r>
-            <a:r>
-              <a:rPr lang="en-GB" dirty="0" smtClean="0"/>
-              <a:t>Services (</a:t>
+              <a:t>Using Nomad to create an app with Azure Mobile Services (</a:t>
             </a:r>
             <a:r>
               <a:rPr lang="en-GB" dirty="0" err="1" smtClean="0"/>

</xml_diff>

<commit_message>
Some other minor changes - can't remember what... or it might just be PPT touched the file in some way.
</commit_message>
<xml_diff>
--- a/Talks/Cross-Platform Mobile Development in Visual Studio.pptx
+++ b/Talks/Cross-Platform Mobile Development in Visual Studio.pptx
@@ -3280,7 +3280,31 @@
                 <a:ea typeface="+mn-ea"/>
                 <a:cs typeface="+mn-cs"/>
               </a:rPr>
-              <a:t>This is where Nomad </a:t>
+              <a:t>This is where Nomad and</a:t>
+            </a:r>
+            <a:r>
+              <a:rPr lang="en-GB" sz="1200" b="0" i="0" u="none" strike="noStrike" kern="1200" baseline="0" dirty="0" smtClean="0">
+                <a:solidFill>
+                  <a:schemeClr val="tx1"/>
+                </a:solidFill>
+                <a:effectLst/>
+                <a:latin typeface="+mn-lt"/>
+                <a:ea typeface="+mn-ea"/>
+                <a:cs typeface="+mn-cs"/>
+              </a:rPr>
+              <a:t> </a:t>
+            </a:r>
+            <a:r>
+              <a:rPr lang="en-GB" sz="1200" b="0" i="0" u="none" strike="noStrike" kern="1200" baseline="0" dirty="0" err="1" smtClean="0">
+                <a:solidFill>
+                  <a:schemeClr val="tx1"/>
+                </a:solidFill>
+                <a:effectLst/>
+                <a:latin typeface="+mn-lt"/>
+                <a:ea typeface="+mn-ea"/>
+                <a:cs typeface="+mn-cs"/>
+              </a:rPr>
+              <a:t>Icenium</a:t>
             </a:r>
             <a:r>
               <a:rPr lang="en-GB" sz="1200" b="0" i="0" u="none" strike="noStrike" kern="1200" dirty="0" smtClean="0">
@@ -3292,7 +3316,31 @@
                 <a:ea typeface="+mn-ea"/>
                 <a:cs typeface="+mn-cs"/>
               </a:rPr>
-              <a:t>and</a:t>
+              <a:t>. Nomad is a solution for creating cross-platform mobile apps built on top of Cordova from within Visual Studio. It supports both </a:t>
+            </a:r>
+            <a:r>
+              <a:rPr lang="en-GB" sz="1200" b="0" i="0" u="none" strike="noStrike" kern="1200" dirty="0" err="1" smtClean="0">
+                <a:solidFill>
+                  <a:schemeClr val="tx1"/>
+                </a:solidFill>
+                <a:effectLst/>
+                <a:latin typeface="+mn-lt"/>
+                <a:ea typeface="+mn-ea"/>
+                <a:cs typeface="+mn-cs"/>
+              </a:rPr>
+              <a:t>iOS</a:t>
+            </a:r>
+            <a:r>
+              <a:rPr lang="en-GB" sz="1200" b="0" i="0" u="none" strike="noStrike" kern="1200" dirty="0" smtClean="0">
+                <a:solidFill>
+                  <a:schemeClr val="tx1"/>
+                </a:solidFill>
+                <a:effectLst/>
+                <a:latin typeface="+mn-lt"/>
+                <a:ea typeface="+mn-ea"/>
+                <a:cs typeface="+mn-cs"/>
+              </a:rPr>
+              <a:t> and Android,</a:t>
             </a:r>
             <a:r>
               <a:rPr lang="en-GB" sz="1200" b="0" i="0" u="none" strike="noStrike" kern="1200" baseline="0" dirty="0" smtClean="0">
@@ -3304,91 +3352,7 @@
                 <a:ea typeface="+mn-ea"/>
                 <a:cs typeface="+mn-cs"/>
               </a:rPr>
-              <a:t> </a:t>
-            </a:r>
-            <a:r>
-              <a:rPr lang="en-GB" sz="1200" b="0" i="0" u="none" strike="noStrike" kern="1200" baseline="0" dirty="0" err="1" smtClean="0">
-                <a:solidFill>
-                  <a:schemeClr val="tx1"/>
-                </a:solidFill>
-                <a:effectLst/>
-                <a:latin typeface="+mn-lt"/>
-                <a:ea typeface="+mn-ea"/>
-                <a:cs typeface="+mn-cs"/>
-              </a:rPr>
-              <a:t>Icenium</a:t>
-            </a:r>
-            <a:r>
-              <a:rPr lang="en-GB" sz="1200" b="0" i="0" u="none" strike="noStrike" kern="1200" dirty="0" smtClean="0">
-                <a:solidFill>
-                  <a:schemeClr val="tx1"/>
-                </a:solidFill>
-                <a:effectLst/>
-                <a:latin typeface="+mn-lt"/>
-                <a:ea typeface="+mn-ea"/>
-                <a:cs typeface="+mn-cs"/>
-              </a:rPr>
-              <a:t>. </a:t>
-            </a:r>
-            <a:r>
-              <a:rPr lang="en-GB" sz="1200" b="0" i="0" u="none" strike="noStrike" kern="1200" dirty="0" smtClean="0">
-                <a:solidFill>
-                  <a:schemeClr val="tx1"/>
-                </a:solidFill>
-                <a:effectLst/>
-                <a:latin typeface="+mn-lt"/>
-                <a:ea typeface="+mn-ea"/>
-                <a:cs typeface="+mn-cs"/>
-              </a:rPr>
-              <a:t>Nomad is a solution for creating cross-platform mobile apps built on top of Cordova from within Visual Studio. It supports both </a:t>
-            </a:r>
-            <a:r>
-              <a:rPr lang="en-GB" sz="1200" b="0" i="0" u="none" strike="noStrike" kern="1200" dirty="0" err="1" smtClean="0">
-                <a:solidFill>
-                  <a:schemeClr val="tx1"/>
-                </a:solidFill>
-                <a:effectLst/>
-                <a:latin typeface="+mn-lt"/>
-                <a:ea typeface="+mn-ea"/>
-                <a:cs typeface="+mn-cs"/>
-              </a:rPr>
-              <a:t>iOS</a:t>
-            </a:r>
-            <a:r>
-              <a:rPr lang="en-GB" sz="1200" b="0" i="0" u="none" strike="noStrike" kern="1200" dirty="0" smtClean="0">
-                <a:solidFill>
-                  <a:schemeClr val="tx1"/>
-                </a:solidFill>
-                <a:effectLst/>
-                <a:latin typeface="+mn-lt"/>
-                <a:ea typeface="+mn-ea"/>
-                <a:cs typeface="+mn-cs"/>
-              </a:rPr>
-              <a:t> and Android,</a:t>
-            </a:r>
-            <a:r>
-              <a:rPr lang="en-GB" sz="1200" b="0" i="0" u="none" strike="noStrike" kern="1200" baseline="0" dirty="0" smtClean="0">
-                <a:solidFill>
-                  <a:schemeClr val="tx1"/>
-                </a:solidFill>
-                <a:effectLst/>
-                <a:latin typeface="+mn-lt"/>
-                <a:ea typeface="+mn-ea"/>
-                <a:cs typeface="+mn-cs"/>
-              </a:rPr>
-              <a:t> and will soon support Windows Phone 8 as well</a:t>
-            </a:r>
-            <a:r>
-              <a:rPr lang="en-GB" sz="1200" b="0" i="0" u="none" strike="noStrike" kern="1200" baseline="0" dirty="0" smtClean="0">
-                <a:solidFill>
-                  <a:schemeClr val="tx1"/>
-                </a:solidFill>
-                <a:effectLst/>
-                <a:latin typeface="+mn-lt"/>
-                <a:ea typeface="+mn-ea"/>
-                <a:cs typeface="+mn-cs"/>
-              </a:rPr>
-              <a:t>. As I said, </a:t>
+              <a:t> and will soon support Windows Phone 8 as well. As I said, </a:t>
             </a:r>
             <a:r>
               <a:rPr lang="en-GB" sz="1200" b="0" i="0" u="none" strike="noStrike" kern="1200" baseline="0" dirty="0" err="1" smtClean="0">

</xml_diff>